<commit_message>
Update Du papier au numérique la gestion des caractères grecs ligaturés.pptx
</commit_message>
<xml_diff>
--- a/JE/Du papier au numérique la gestion des caractères grecs ligaturés.pptx
+++ b/JE/Du papier au numérique la gestion des caractères grecs ligaturés.pptx
@@ -243,7 +243,7 @@
           <a:p>
             <a:fld id="{F699991C-361E-EA40-B5C3-147A8933D896}" type="datetimeFigureOut">
               <a:rPr lang="fr-FR" smtClean="0"/>
-              <a:t>22/08/2022</a:t>
+              <a:t>23/08/2022</a:t>
             </a:fld>
             <a:endParaRPr lang="fr-FR"/>
           </a:p>
@@ -384,7 +384,7 @@
           <a:p>
             <a:fld id="{F699991C-361E-EA40-B5C3-147A8933D896}" type="datetimeFigureOut">
               <a:rPr lang="fr-FR" smtClean="0"/>
-              <a:t>22/08/2022</a:t>
+              <a:t>23/08/2022</a:t>
             </a:fld>
             <a:endParaRPr lang="fr-FR"/>
           </a:p>
@@ -535,7 +535,7 @@
           <a:p>
             <a:fld id="{F699991C-361E-EA40-B5C3-147A8933D896}" type="datetimeFigureOut">
               <a:rPr lang="fr-FR" smtClean="0"/>
-              <a:t>22/08/2022</a:t>
+              <a:t>23/08/2022</a:t>
             </a:fld>
             <a:endParaRPr lang="fr-FR"/>
           </a:p>
@@ -676,7 +676,7 @@
           <a:p>
             <a:fld id="{F699991C-361E-EA40-B5C3-147A8933D896}" type="datetimeFigureOut">
               <a:rPr lang="fr-FR" smtClean="0"/>
-              <a:t>22/08/2022</a:t>
+              <a:t>23/08/2022</a:t>
             </a:fld>
             <a:endParaRPr lang="fr-FR"/>
           </a:p>
@@ -920,7 +920,7 @@
           <a:p>
             <a:fld id="{F699991C-361E-EA40-B5C3-147A8933D896}" type="datetimeFigureOut">
               <a:rPr lang="fr-FR" smtClean="0"/>
-              <a:t>22/08/2022</a:t>
+              <a:t>23/08/2022</a:t>
             </a:fld>
             <a:endParaRPr lang="fr-FR"/>
           </a:p>
@@ -1099,7 +1099,7 @@
           <a:p>
             <a:fld id="{F699991C-361E-EA40-B5C3-147A8933D896}" type="datetimeFigureOut">
               <a:rPr lang="fr-FR" smtClean="0"/>
-              <a:t>22/08/2022</a:t>
+              <a:t>23/08/2022</a:t>
             </a:fld>
             <a:endParaRPr lang="fr-FR"/>
           </a:p>
@@ -1423,7 +1423,7 @@
           <a:p>
             <a:fld id="{F699991C-361E-EA40-B5C3-147A8933D896}" type="datetimeFigureOut">
               <a:rPr lang="fr-FR" smtClean="0"/>
-              <a:t>22/08/2022</a:t>
+              <a:t>23/08/2022</a:t>
             </a:fld>
             <a:endParaRPr lang="fr-FR"/>
           </a:p>
@@ -1536,7 +1536,7 @@
           <a:p>
             <a:fld id="{F699991C-361E-EA40-B5C3-147A8933D896}" type="datetimeFigureOut">
               <a:rPr lang="fr-FR" smtClean="0"/>
-              <a:t>22/08/2022</a:t>
+              <a:t>23/08/2022</a:t>
             </a:fld>
             <a:endParaRPr lang="fr-FR"/>
           </a:p>
@@ -1626,7 +1626,7 @@
           <a:p>
             <a:fld id="{F699991C-361E-EA40-B5C3-147A8933D896}" type="datetimeFigureOut">
               <a:rPr lang="fr-FR" smtClean="0"/>
-              <a:t>22/08/2022</a:t>
+              <a:t>23/08/2022</a:t>
             </a:fld>
             <a:endParaRPr lang="fr-FR"/>
           </a:p>
@@ -1879,7 +1879,7 @@
           <a:p>
             <a:fld id="{F699991C-361E-EA40-B5C3-147A8933D896}" type="datetimeFigureOut">
               <a:rPr lang="fr-FR" smtClean="0"/>
-              <a:t>22/08/2022</a:t>
+              <a:t>23/08/2022</a:t>
             </a:fld>
             <a:endParaRPr lang="fr-FR"/>
           </a:p>
@@ -2136,7 +2136,7 @@
           <a:p>
             <a:fld id="{F699991C-361E-EA40-B5C3-147A8933D896}" type="datetimeFigureOut">
               <a:rPr lang="fr-FR" smtClean="0"/>
-              <a:t>22/08/2022</a:t>
+              <a:t>23/08/2022</a:t>
             </a:fld>
             <a:endParaRPr lang="fr-FR"/>
           </a:p>
@@ -2320,7 +2320,7 @@
           <a:p>
             <a:fld id="{F699991C-361E-EA40-B5C3-147A8933D896}" type="datetimeFigureOut">
               <a:rPr lang="fr-FR" smtClean="0"/>
-              <a:t>22/08/2022</a:t>
+              <a:t>23/08/2022</a:t>
             </a:fld>
             <a:endParaRPr lang="fr-FR"/>
           </a:p>
@@ -2835,8 +2835,8 @@
         </p:nvSpPr>
         <p:spPr>
           <a:xfrm>
-            <a:off x="9479913" y="7389045"/>
-            <a:ext cx="2898772" cy="1315104"/>
+            <a:off x="2093596" y="10034260"/>
+            <a:ext cx="3037840" cy="1315104"/>
           </a:xfrm>
           <a:prstGeom prst="rect">
             <a:avLst/>

</xml_diff>